<commit_message>
2026-02-15 AI News Report + Podcast
</commit_message>
<xml_diff>
--- a/2026-02-15/report_2026-02-15.pptx
+++ b/2026-02-15/report_2026-02-15.pptx
@@ -5684,7 +5684,7 @@
               </a:defRPr>
             </a:pPr>
             <a:r>
-              <a:t>► CNBC: https://www.cnbc.com/2026/02/09/sam-altman-touts-chatgpt-growth-as-openai-nears-100-billion-funding.html</a:t>
+              <a:t>► PitchBook: https://pitchbook.com/news/articles/anthropic-surpasses-openai-in-ai-cash-race-after-raising-30b-series-g</a:t>
             </a:r>
           </a:p>
           <a:p>
@@ -5700,7 +5700,7 @@
               </a:defRPr>
             </a:pPr>
             <a:r>
-              <a:t>► PitchBook: https://pitchbook.com/news/articles/anthropic-surpasses-openai-in-ai-cash-race-after-raising-30b-series-g</a:t>
+              <a:t>► Fortune / Reuters: https://fortune.com/2026/02/11/half-of-xai-founding-team-has-left-elon-musks-ai-company-potentially-complicating-his-plans-for-a-blockbuster-spacex-ipo/</a:t>
             </a:r>
           </a:p>
           <a:p>
@@ -5716,7 +5716,7 @@
               </a:defRPr>
             </a:pPr>
             <a:r>
-              <a:t>► Yahoo Finance / Financial Times: https://finance.yahoo.com/news/microsoft-ai-chief-confirms-plan-041455005.html</a:t>
+              <a:t>► CNBC / UN News: https://www.cnbc.com/2025/10/28/google-nextera-iowa-duane-arnold-nuclear-power-plant-ai-energy-demand-data-centers.html</a:t>
             </a:r>
           </a:p>
           <a:p>
@@ -5748,7 +5748,7 @@
               </a:defRPr>
             </a:pPr>
             <a:r>
-              <a:t>► Yahoo Finance / Futurum Research: https://finance.yahoo.com/news/big-tech-set-to-spend-650-billion-2026-ai-investments-soar-163907630.html</a:t>
+              <a:t>► Trendforce / The Information: https://www.trendforce.com/news/2026/02/06/news-nvidia-reportedly-plans-no-new-gaming-gpu-in-2026-amid-memory-tightness-first-time-in-30-years</a:t>
             </a:r>
           </a:p>
         </p:txBody>
@@ -5797,7 +5797,7 @@
               </a:defRPr>
             </a:pPr>
             <a:r>
-              <a:t>► Trendforce / The Information: https://www.trendforce.com/news/2026/02/06/news-nvidia-reportedly-plans-no-new-gaming-gpu-in-2026-amid-memory-tightness-first-time-in-30-years</a:t>
+              <a:t>► Business Insider: https://www.businessinsider.com/matt-shumer-something-big-is-happening-essay-ai-disruption-2026-2</a:t>
             </a:r>
           </a:p>
           <a:p>
@@ -5813,7 +5813,7 @@
               </a:defRPr>
             </a:pPr>
             <a:r>
-              <a:t>► Business Insider: https://www.businessinsider.com/matt-shumer-something-big-is-happening-essay-ai-disruption-2026-2</a:t>
+              <a:t>► Yahoo Finance / Futurum Research: https://finance.yahoo.com/news/big-tech-set-to-spend-650-billion-2026-ai-investments-soar-163907630.html</a:t>
             </a:r>
           </a:p>
           <a:p>
@@ -5829,7 +5829,7 @@
               </a:defRPr>
             </a:pPr>
             <a:r>
-              <a:t>► Fortune / Reuters: https://fortune.com/2026/02/11/half-of-xai-founding-team-has-left-elon-musks-ai-company-potentially-complicating-his-plans-for-a-blockbuster-spacex-ipo/</a:t>
+              <a:t>► Yahoo Finance / Financial Times: https://finance.yahoo.com/news/microsoft-ai-chief-confirms-plan-041455005.html</a:t>
             </a:r>
           </a:p>
           <a:p>
@@ -5845,7 +5845,7 @@
               </a:defRPr>
             </a:pPr>
             <a:r>
-              <a:t>► CNBC / UN News: https://www.cnbc.com/2025/10/28/google-nextera-iowa-duane-arnold-nuclear-power-plant-ai-energy-demand-data-centers.html</a:t>
+              <a:t>► CNBC: https://www.cnbc.com/2026/02/09/sam-altman-touts-chatgpt-growth-as-openai-nears-100-billion-funding.html</a:t>
             </a:r>
           </a:p>
         </p:txBody>

</xml_diff>